<commit_message>
Final report and presentation updates to include section 5 content
</commit_message>
<xml_diff>
--- a/final/final_version.pptx
+++ b/final/final_version.pptx
@@ -6,7 +6,7 @@
     <p:sldMasterId id="2147483660" r:id="rId2"/>
   </p:sldMasterIdLst>
   <p:notesMasterIdLst>
-    <p:notesMasterId r:id="rId24"/>
+    <p:notesMasterId r:id="rId29"/>
   </p:notesMasterIdLst>
   <p:sldIdLst>
     <p:sldId id="256" r:id="rId3"/>
@@ -29,7 +29,12 @@
     <p:sldId id="281" r:id="rId20"/>
     <p:sldId id="282" r:id="rId21"/>
     <p:sldId id="283" r:id="rId22"/>
-    <p:sldId id="266" r:id="rId23"/>
+    <p:sldId id="284" r:id="rId23"/>
+    <p:sldId id="285" r:id="rId24"/>
+    <p:sldId id="286" r:id="rId25"/>
+    <p:sldId id="287" r:id="rId26"/>
+    <p:sldId id="288" r:id="rId27"/>
+    <p:sldId id="289" r:id="rId28"/>
   </p:sldIdLst>
   <p:sldSz cx="12192000" cy="6858000"/>
   <p:notesSz cx="6858000" cy="9144000"/>
@@ -128,6 +133,11 @@
       </a:defRPr>
     </a:lvl9pPr>
   </p:defaultTextStyle>
+  <p:extLst>
+    <p:ext uri="{EFAFB233-063F-42B5-8137-9DF3F51BA10A}">
+      <p15:sldGuideLst xmlns:p15="http://schemas.microsoft.com/office/powerpoint/2012/main"/>
+    </p:ext>
+  </p:extLst>
 </p:presentation>
 </file>
 
@@ -17719,13 +17729,7 @@
   <p:cSld>
     <p:spTree>
       <p:nvGrpSpPr>
-        <p:cNvPr id="1" name="">
-          <a:extLst>
-            <a:ext uri="{FF2B5EF4-FFF2-40B4-BE49-F238E27FC236}">
-              <a16:creationId xmlns:a16="http://schemas.microsoft.com/office/drawing/2014/main" id="{3B2E8370-28D2-A438-AABD-768C05ACD8A1}"/>
-            </a:ext>
-          </a:extLst>
-        </p:cNvPr>
+        <p:cNvPr id="1" name=""/>
         <p:cNvGrpSpPr/>
         <p:nvPr/>
       </p:nvGrpSpPr>
@@ -17742,7 +17746,7 @@
           <p:cNvPr id="2" name="Title 1">
             <a:extLst>
               <a:ext uri="{FF2B5EF4-FFF2-40B4-BE49-F238E27FC236}">
-                <a16:creationId xmlns:a16="http://schemas.microsoft.com/office/drawing/2014/main" id="{27EFA682-C551-D99F-89A6-BFDF4D6DA384}"/>
+                <a16:creationId xmlns:a16="http://schemas.microsoft.com/office/drawing/2014/main" id="{B06D8BA0-1295-49EF-52E0-BD2381C992B3}"/>
               </a:ext>
             </a:extLst>
           </p:cNvPr>
@@ -17772,7 +17776,7 @@
           <p:cNvPr id="5" name="Subtitle 4">
             <a:extLst>
               <a:ext uri="{FF2B5EF4-FFF2-40B4-BE49-F238E27FC236}">
-                <a16:creationId xmlns:a16="http://schemas.microsoft.com/office/drawing/2014/main" id="{952974DD-8AB3-6BFE-A613-7078D074D2B5}"/>
+                <a16:creationId xmlns:a16="http://schemas.microsoft.com/office/drawing/2014/main" id="{05DC3088-C7C7-0ED1-D85B-8387308F77F0}"/>
               </a:ext>
             </a:extLst>
           </p:cNvPr>
@@ -17788,14 +17792,597 @@
           <a:bodyPr/>
           <a:lstStyle/>
           <a:p>
-            <a:endParaRPr lang="en-US" dirty="0"/>
+            <a:r>
+              <a:rPr lang="en-US" dirty="0"/>
+              <a:t> Limitations, Generalization, and Broader Implications</a:t>
+            </a:r>
           </a:p>
         </p:txBody>
       </p:sp>
     </p:spTree>
     <p:extLst>
       <p:ext uri="{BB962C8B-B14F-4D97-AF65-F5344CB8AC3E}">
-        <p14:creationId xmlns:p14="http://schemas.microsoft.com/office/powerpoint/2010/main" val="309957563"/>
+        <p14:creationId xmlns:p14="http://schemas.microsoft.com/office/powerpoint/2010/main" val="3216737237"/>
+      </p:ext>
+    </p:extLst>
+  </p:cSld>
+  <p:clrMapOvr>
+    <a:masterClrMapping/>
+  </p:clrMapOvr>
+</p:sld>
+</file>
+
+<file path=ppt/slides/slide22.xml><?xml version="1.0" encoding="utf-8"?>
+<p:sld xmlns:a="http://schemas.openxmlformats.org/drawingml/2006/main" xmlns:r="http://schemas.openxmlformats.org/officeDocument/2006/relationships" xmlns:p="http://schemas.openxmlformats.org/presentationml/2006/main">
+  <p:cSld>
+    <p:spTree>
+      <p:nvGrpSpPr>
+        <p:cNvPr id="1" name=""/>
+        <p:cNvGrpSpPr/>
+        <p:nvPr/>
+      </p:nvGrpSpPr>
+      <p:grpSpPr>
+        <a:xfrm>
+          <a:off x="0" y="0"/>
+          <a:ext cx="0" cy="0"/>
+          <a:chOff x="0" y="0"/>
+          <a:chExt cx="0" cy="0"/>
+        </a:xfrm>
+      </p:grpSpPr>
+      <p:sp>
+        <p:nvSpPr>
+          <p:cNvPr id="2" name="Title 1">
+            <a:extLst>
+              <a:ext uri="{FF2B5EF4-FFF2-40B4-BE49-F238E27FC236}">
+                <a16:creationId xmlns:a16="http://schemas.microsoft.com/office/drawing/2014/main" id="{CDF7DCA3-C464-F0F6-3ECE-D8F13D3B824B}"/>
+              </a:ext>
+            </a:extLst>
+          </p:cNvPr>
+          <p:cNvSpPr>
+            <a:spLocks noGrp="1"/>
+          </p:cNvSpPr>
+          <p:nvPr>
+            <p:ph type="title"/>
+          </p:nvPr>
+        </p:nvSpPr>
+        <p:spPr>
+          <a:xfrm>
+            <a:off x="532149" y="365125"/>
+            <a:ext cx="11407515" cy="849078"/>
+          </a:xfrm>
+        </p:spPr>
+        <p:txBody>
+          <a:bodyPr>
+            <a:normAutofit/>
+          </a:bodyPr>
+          <a:lstStyle/>
+          <a:p>
+            <a:r>
+              <a:rPr lang="en-GB" dirty="0"/>
+              <a:t>Implications for alignment research</a:t>
+            </a:r>
+            <a:endParaRPr lang="en-US" dirty="0">
+              <a:latin typeface="Abadi" panose="020B0604020104020204" pitchFamily="34" charset="0"/>
+            </a:endParaRPr>
+          </a:p>
+        </p:txBody>
+      </p:sp>
+      <p:sp>
+        <p:nvSpPr>
+          <p:cNvPr id="3" name="Content Placeholder 2">
+            <a:extLst>
+              <a:ext uri="{FF2B5EF4-FFF2-40B4-BE49-F238E27FC236}">
+                <a16:creationId xmlns:a16="http://schemas.microsoft.com/office/drawing/2014/main" id="{2DDF899B-C6B2-1335-AE87-5E057C424DD3}"/>
+              </a:ext>
+            </a:extLst>
+          </p:cNvPr>
+          <p:cNvSpPr>
+            <a:spLocks noGrp="1"/>
+          </p:cNvSpPr>
+          <p:nvPr>
+            <p:ph idx="1"/>
+          </p:nvPr>
+        </p:nvSpPr>
+        <p:spPr>
+          <a:xfrm>
+            <a:off x="532152" y="1491521"/>
+            <a:ext cx="8856398" cy="4991726"/>
+          </a:xfrm>
+        </p:spPr>
+        <p:txBody>
+          <a:bodyPr>
+            <a:normAutofit/>
+          </a:bodyPr>
+          <a:lstStyle/>
+          <a:p>
+            <a:pPr lvl="0"/>
+            <a:r>
+              <a:rPr lang="en-GB" sz="2400" dirty="0"/>
+              <a:t>The cost of increasing model alignment is modest to relative to pretraining</a:t>
+            </a:r>
+          </a:p>
+          <a:p>
+            <a:pPr lvl="0"/>
+            <a:r>
+              <a:rPr lang="en-GB" sz="2400" dirty="0"/>
+              <a:t>The model generalizes instructions to settings that it wasn’t supervised in</a:t>
+            </a:r>
+          </a:p>
+          <a:p>
+            <a:pPr lvl="0"/>
+            <a:r>
+              <a:rPr lang="en-GB" sz="2400" dirty="0"/>
+              <a:t>Performance degradation was mitigated by the fine-tuning.</a:t>
+            </a:r>
+            <a:endParaRPr lang="pt-PT" sz="2400" dirty="0"/>
+          </a:p>
+          <a:p>
+            <a:pPr lvl="0"/>
+            <a:r>
+              <a:rPr lang="en-GB" sz="2400" dirty="0"/>
+              <a:t>The techniques were validated from research of the real world.</a:t>
+            </a:r>
+            <a:endParaRPr lang="pt-PT" sz="2400" dirty="0"/>
+          </a:p>
+          <a:p>
+            <a:pPr marL="0" indent="0">
+              <a:lnSpc>
+                <a:spcPct val="110000"/>
+              </a:lnSpc>
+              <a:buNone/>
+            </a:pPr>
+            <a:endParaRPr lang="en-US" dirty="0">
+              <a:latin typeface="Abadi" panose="020B0604020104020204" pitchFamily="34" charset="0"/>
+            </a:endParaRPr>
+          </a:p>
+        </p:txBody>
+      </p:sp>
+    </p:spTree>
+    <p:extLst>
+      <p:ext uri="{BB962C8B-B14F-4D97-AF65-F5344CB8AC3E}">
+        <p14:creationId xmlns:p14="http://schemas.microsoft.com/office/powerpoint/2010/main" val="3621940349"/>
+      </p:ext>
+    </p:extLst>
+  </p:cSld>
+  <p:clrMapOvr>
+    <a:masterClrMapping/>
+  </p:clrMapOvr>
+</p:sld>
+</file>
+
+<file path=ppt/slides/slide23.xml><?xml version="1.0" encoding="utf-8"?>
+<p:sld xmlns:a="http://schemas.openxmlformats.org/drawingml/2006/main" xmlns:r="http://schemas.openxmlformats.org/officeDocument/2006/relationships" xmlns:p="http://schemas.openxmlformats.org/presentationml/2006/main">
+  <p:cSld>
+    <p:spTree>
+      <p:nvGrpSpPr>
+        <p:cNvPr id="1" name=""/>
+        <p:cNvGrpSpPr/>
+        <p:nvPr/>
+      </p:nvGrpSpPr>
+      <p:grpSpPr>
+        <a:xfrm>
+          <a:off x="0" y="0"/>
+          <a:ext cx="0" cy="0"/>
+          <a:chOff x="0" y="0"/>
+          <a:chExt cx="0" cy="0"/>
+        </a:xfrm>
+      </p:grpSpPr>
+      <p:sp>
+        <p:nvSpPr>
+          <p:cNvPr id="2" name="Title 1">
+            <a:extLst>
+              <a:ext uri="{FF2B5EF4-FFF2-40B4-BE49-F238E27FC236}">
+                <a16:creationId xmlns:a16="http://schemas.microsoft.com/office/drawing/2014/main" id="{A1C9B15A-B047-521B-DBF1-B509C05F7D95}"/>
+              </a:ext>
+            </a:extLst>
+          </p:cNvPr>
+          <p:cNvSpPr>
+            <a:spLocks noGrp="1"/>
+          </p:cNvSpPr>
+          <p:nvPr>
+            <p:ph type="title"/>
+          </p:nvPr>
+        </p:nvSpPr>
+        <p:spPr/>
+        <p:txBody>
+          <a:bodyPr/>
+          <a:lstStyle/>
+          <a:p>
+            <a:r>
+              <a:rPr lang="en-GB" dirty="0"/>
+              <a:t>Who are we aligning to?</a:t>
+            </a:r>
+            <a:endParaRPr lang="pt-PT" dirty="0"/>
+          </a:p>
+        </p:txBody>
+      </p:sp>
+      <p:sp>
+        <p:nvSpPr>
+          <p:cNvPr id="3" name="Content Placeholder 2">
+            <a:extLst>
+              <a:ext uri="{FF2B5EF4-FFF2-40B4-BE49-F238E27FC236}">
+                <a16:creationId xmlns:a16="http://schemas.microsoft.com/office/drawing/2014/main" id="{818FB10B-833B-55E0-4920-C4FE776BCAF3}"/>
+              </a:ext>
+            </a:extLst>
+          </p:cNvPr>
+          <p:cNvSpPr>
+            <a:spLocks noGrp="1"/>
+          </p:cNvSpPr>
+          <p:nvPr>
+            <p:ph idx="1"/>
+          </p:nvPr>
+        </p:nvSpPr>
+        <p:spPr>
+          <a:xfrm>
+            <a:off x="838200" y="1825625"/>
+            <a:ext cx="8911856" cy="4351338"/>
+          </a:xfrm>
+        </p:spPr>
+        <p:txBody>
+          <a:bodyPr>
+            <a:normAutofit/>
+          </a:bodyPr>
+          <a:lstStyle/>
+          <a:p>
+            <a:pPr lvl="0"/>
+            <a:r>
+              <a:rPr lang="en-GB" sz="2400" dirty="0"/>
+              <a:t>The model is aligned to the labeller’s demonstrations and preferences. The labeller’s were mostly English‐speaking people </a:t>
+            </a:r>
+          </a:p>
+          <a:p>
+            <a:pPr lvl="0"/>
+            <a:r>
+              <a:rPr lang="en-GB" sz="2400" dirty="0"/>
+              <a:t>The labelling instructions are created by the researcher’s, creating an inherent bias to their preferences.</a:t>
+            </a:r>
+            <a:endParaRPr lang="pt-PT" sz="2400" dirty="0"/>
+          </a:p>
+          <a:p>
+            <a:pPr lvl="0"/>
+            <a:r>
+              <a:rPr lang="en-GB" sz="2400" dirty="0"/>
+              <a:t>The training data is determined by prompts sent by customers, and as such, implicitly aligning with what customers think is valuable</a:t>
+            </a:r>
+            <a:endParaRPr lang="pt-PT" sz="2400" dirty="0"/>
+          </a:p>
+          <a:p>
+            <a:pPr lvl="0"/>
+            <a:r>
+              <a:rPr lang="en-GB" sz="2400" dirty="0"/>
+              <a:t>The customers of OpenAI are not representative of all potential users, nor by all individuals and groups impacted by language model use</a:t>
+            </a:r>
+            <a:endParaRPr lang="pt-PT" sz="2400" dirty="0"/>
+          </a:p>
+          <a:p>
+            <a:endParaRPr lang="pt-PT" sz="2400" dirty="0"/>
+          </a:p>
+        </p:txBody>
+      </p:sp>
+    </p:spTree>
+    <p:extLst>
+      <p:ext uri="{BB962C8B-B14F-4D97-AF65-F5344CB8AC3E}">
+        <p14:creationId xmlns:p14="http://schemas.microsoft.com/office/powerpoint/2010/main" val="1598766342"/>
+      </p:ext>
+    </p:extLst>
+  </p:cSld>
+  <p:clrMapOvr>
+    <a:masterClrMapping/>
+  </p:clrMapOvr>
+</p:sld>
+</file>
+
+<file path=ppt/slides/slide24.xml><?xml version="1.0" encoding="utf-8"?>
+<p:sld xmlns:a="http://schemas.openxmlformats.org/drawingml/2006/main" xmlns:r="http://schemas.openxmlformats.org/officeDocument/2006/relationships" xmlns:p="http://schemas.openxmlformats.org/presentationml/2006/main">
+  <p:cSld>
+    <p:spTree>
+      <p:nvGrpSpPr>
+        <p:cNvPr id="1" name=""/>
+        <p:cNvGrpSpPr/>
+        <p:nvPr/>
+      </p:nvGrpSpPr>
+      <p:grpSpPr>
+        <a:xfrm>
+          <a:off x="0" y="0"/>
+          <a:ext cx="0" cy="0"/>
+          <a:chOff x="0" y="0"/>
+          <a:chExt cx="0" cy="0"/>
+        </a:xfrm>
+      </p:grpSpPr>
+      <p:sp>
+        <p:nvSpPr>
+          <p:cNvPr id="2" name="Title 1">
+            <a:extLst>
+              <a:ext uri="{FF2B5EF4-FFF2-40B4-BE49-F238E27FC236}">
+                <a16:creationId xmlns:a16="http://schemas.microsoft.com/office/drawing/2014/main" id="{181DD012-10D4-225E-A862-89C9FF0A0AA5}"/>
+              </a:ext>
+            </a:extLst>
+          </p:cNvPr>
+          <p:cNvSpPr>
+            <a:spLocks noGrp="1"/>
+          </p:cNvSpPr>
+          <p:nvPr>
+            <p:ph type="title"/>
+          </p:nvPr>
+        </p:nvSpPr>
+        <p:spPr/>
+        <p:txBody>
+          <a:bodyPr/>
+          <a:lstStyle/>
+          <a:p>
+            <a:r>
+              <a:rPr lang="en-GB" dirty="0"/>
+              <a:t>Limitations</a:t>
+            </a:r>
+            <a:endParaRPr lang="pt-PT" dirty="0"/>
+          </a:p>
+        </p:txBody>
+      </p:sp>
+      <p:sp>
+        <p:nvSpPr>
+          <p:cNvPr id="3" name="Content Placeholder 2">
+            <a:extLst>
+              <a:ext uri="{FF2B5EF4-FFF2-40B4-BE49-F238E27FC236}">
+                <a16:creationId xmlns:a16="http://schemas.microsoft.com/office/drawing/2014/main" id="{A211F169-052A-8C4C-C1B1-9FB8B97F9E4E}"/>
+              </a:ext>
+            </a:extLst>
+          </p:cNvPr>
+          <p:cNvSpPr>
+            <a:spLocks noGrp="1"/>
+          </p:cNvSpPr>
+          <p:nvPr>
+            <p:ph idx="1"/>
+          </p:nvPr>
+        </p:nvSpPr>
+        <p:spPr>
+          <a:xfrm>
+            <a:off x="838200" y="1825625"/>
+            <a:ext cx="7550888" cy="4351338"/>
+          </a:xfrm>
+        </p:spPr>
+        <p:txBody>
+          <a:bodyPr>
+            <a:normAutofit/>
+          </a:bodyPr>
+          <a:lstStyle/>
+          <a:p>
+            <a:r>
+              <a:rPr lang="en-GB" sz="2400" dirty="0"/>
+              <a:t>The labeller population is not fully representative of all users or all cultural/linguistic backgrounds. Most prompts and data were in English, and many of the comparisons were labelled by only one annotator.</a:t>
+            </a:r>
+          </a:p>
+          <a:p>
+            <a:r>
+              <a:rPr lang="en-GB" sz="2400" dirty="0"/>
+              <a:t>The model sometimes would fail to follow instructions, hallucinate facts, generate biased or toxic outputs, or comply with harmful user instructions.</a:t>
+            </a:r>
+            <a:endParaRPr lang="pt-PT" sz="2400" dirty="0"/>
+          </a:p>
+        </p:txBody>
+      </p:sp>
+    </p:spTree>
+    <p:extLst>
+      <p:ext uri="{BB962C8B-B14F-4D97-AF65-F5344CB8AC3E}">
+        <p14:creationId xmlns:p14="http://schemas.microsoft.com/office/powerpoint/2010/main" val="3831542408"/>
+      </p:ext>
+    </p:extLst>
+  </p:cSld>
+  <p:clrMapOvr>
+    <a:masterClrMapping/>
+  </p:clrMapOvr>
+</p:sld>
+</file>
+
+<file path=ppt/slides/slide25.xml><?xml version="1.0" encoding="utf-8"?>
+<p:sld xmlns:a="http://schemas.openxmlformats.org/drawingml/2006/main" xmlns:r="http://schemas.openxmlformats.org/officeDocument/2006/relationships" xmlns:p="http://schemas.openxmlformats.org/presentationml/2006/main">
+  <p:cSld>
+    <p:spTree>
+      <p:nvGrpSpPr>
+        <p:cNvPr id="1" name=""/>
+        <p:cNvGrpSpPr/>
+        <p:nvPr/>
+      </p:nvGrpSpPr>
+      <p:grpSpPr>
+        <a:xfrm>
+          <a:off x="0" y="0"/>
+          <a:ext cx="0" cy="0"/>
+          <a:chOff x="0" y="0"/>
+          <a:chExt cx="0" cy="0"/>
+        </a:xfrm>
+      </p:grpSpPr>
+      <p:sp>
+        <p:nvSpPr>
+          <p:cNvPr id="2" name="Title 1">
+            <a:extLst>
+              <a:ext uri="{FF2B5EF4-FFF2-40B4-BE49-F238E27FC236}">
+                <a16:creationId xmlns:a16="http://schemas.microsoft.com/office/drawing/2014/main" id="{AE9B55A0-E705-CF68-E0A7-74777D207EC3}"/>
+              </a:ext>
+            </a:extLst>
+          </p:cNvPr>
+          <p:cNvSpPr>
+            <a:spLocks noGrp="1"/>
+          </p:cNvSpPr>
+          <p:nvPr>
+            <p:ph type="title"/>
+          </p:nvPr>
+        </p:nvSpPr>
+        <p:spPr/>
+        <p:txBody>
+          <a:bodyPr/>
+          <a:lstStyle/>
+          <a:p>
+            <a:r>
+              <a:rPr lang="en-GB" dirty="0"/>
+              <a:t>Open questions</a:t>
+            </a:r>
+            <a:endParaRPr lang="pt-PT" dirty="0"/>
+          </a:p>
+        </p:txBody>
+      </p:sp>
+      <p:sp>
+        <p:nvSpPr>
+          <p:cNvPr id="3" name="Content Placeholder 2">
+            <a:extLst>
+              <a:ext uri="{FF2B5EF4-FFF2-40B4-BE49-F238E27FC236}">
+                <a16:creationId xmlns:a16="http://schemas.microsoft.com/office/drawing/2014/main" id="{821FA593-D2B0-29CD-2FD6-09FA447167B3}"/>
+              </a:ext>
+            </a:extLst>
+          </p:cNvPr>
+          <p:cNvSpPr>
+            <a:spLocks noGrp="1"/>
+          </p:cNvSpPr>
+          <p:nvPr>
+            <p:ph idx="1"/>
+          </p:nvPr>
+        </p:nvSpPr>
+        <p:spPr/>
+        <p:txBody>
+          <a:bodyPr>
+            <a:normAutofit/>
+          </a:bodyPr>
+          <a:lstStyle/>
+          <a:p>
+            <a:r>
+              <a:rPr lang="en-GB" sz="2400" dirty="0"/>
+              <a:t>Collection of worst-case scenarios, filtering pre-training data, and combining different methods to reduce the propensity to generate toxic outputs</a:t>
+            </a:r>
+          </a:p>
+          <a:p>
+            <a:r>
+              <a:rPr lang="en-GB" sz="2400" dirty="0"/>
+              <a:t>Whether an output is harmful will depend on the context. Also, harmful outputs can be beneficial for data augmentation.</a:t>
+            </a:r>
+            <a:endParaRPr lang="pt-PT" sz="2400" dirty="0"/>
+          </a:p>
+          <a:p>
+            <a:r>
+              <a:rPr lang="en-GB" sz="2400" dirty="0"/>
+              <a:t>To improve the controllability of the model it may be useful to allow users to specify preferences</a:t>
+            </a:r>
+          </a:p>
+          <a:p>
+            <a:r>
+              <a:rPr lang="en-GB" sz="2400" dirty="0"/>
+              <a:t>Making comparisons of text may not be the best way to align models</a:t>
+            </a:r>
+            <a:endParaRPr lang="pt-PT" sz="2400" dirty="0"/>
+          </a:p>
+        </p:txBody>
+      </p:sp>
+    </p:spTree>
+    <p:extLst>
+      <p:ext uri="{BB962C8B-B14F-4D97-AF65-F5344CB8AC3E}">
+        <p14:creationId xmlns:p14="http://schemas.microsoft.com/office/powerpoint/2010/main" val="1009892861"/>
+      </p:ext>
+    </p:extLst>
+  </p:cSld>
+  <p:clrMapOvr>
+    <a:masterClrMapping/>
+  </p:clrMapOvr>
+</p:sld>
+</file>
+
+<file path=ppt/slides/slide26.xml><?xml version="1.0" encoding="utf-8"?>
+<p:sld xmlns:a="http://schemas.openxmlformats.org/drawingml/2006/main" xmlns:r="http://schemas.openxmlformats.org/officeDocument/2006/relationships" xmlns:p="http://schemas.openxmlformats.org/presentationml/2006/main">
+  <p:cSld>
+    <p:spTree>
+      <p:nvGrpSpPr>
+        <p:cNvPr id="1" name=""/>
+        <p:cNvGrpSpPr/>
+        <p:nvPr/>
+      </p:nvGrpSpPr>
+      <p:grpSpPr>
+        <a:xfrm>
+          <a:off x="0" y="0"/>
+          <a:ext cx="0" cy="0"/>
+          <a:chOff x="0" y="0"/>
+          <a:chExt cx="0" cy="0"/>
+        </a:xfrm>
+      </p:grpSpPr>
+      <p:sp>
+        <p:nvSpPr>
+          <p:cNvPr id="2" name="Title 1">
+            <a:extLst>
+              <a:ext uri="{FF2B5EF4-FFF2-40B4-BE49-F238E27FC236}">
+                <a16:creationId xmlns:a16="http://schemas.microsoft.com/office/drawing/2014/main" id="{4D4D662A-1550-FECC-9C0B-2133531728D1}"/>
+              </a:ext>
+            </a:extLst>
+          </p:cNvPr>
+          <p:cNvSpPr>
+            <a:spLocks noGrp="1"/>
+          </p:cNvSpPr>
+          <p:nvPr>
+            <p:ph type="title"/>
+          </p:nvPr>
+        </p:nvSpPr>
+        <p:spPr/>
+        <p:txBody>
+          <a:bodyPr/>
+          <a:lstStyle/>
+          <a:p>
+            <a:r>
+              <a:rPr lang="en-GB" dirty="0"/>
+              <a:t>Broader Impact</a:t>
+            </a:r>
+            <a:endParaRPr lang="pt-PT" dirty="0"/>
+          </a:p>
+        </p:txBody>
+      </p:sp>
+      <p:sp>
+        <p:nvSpPr>
+          <p:cNvPr id="3" name="Content Placeholder 2">
+            <a:extLst>
+              <a:ext uri="{FF2B5EF4-FFF2-40B4-BE49-F238E27FC236}">
+                <a16:creationId xmlns:a16="http://schemas.microsoft.com/office/drawing/2014/main" id="{B60E3C78-20CF-3A9B-3D5E-08C26751E45B}"/>
+              </a:ext>
+            </a:extLst>
+          </p:cNvPr>
+          <p:cNvSpPr>
+            <a:spLocks noGrp="1"/>
+          </p:cNvSpPr>
+          <p:nvPr>
+            <p:ph idx="1"/>
+          </p:nvPr>
+        </p:nvSpPr>
+        <p:spPr/>
+        <p:txBody>
+          <a:bodyPr/>
+          <a:lstStyle/>
+          <a:p>
+            <a:r>
+              <a:rPr lang="en-GB" sz="2400" dirty="0"/>
+              <a:t>Deployment carries risks of bias, misalignment with under‐represented groups, or unintended consequences.</a:t>
+            </a:r>
+            <a:endParaRPr lang="pt-PT" sz="2400" dirty="0"/>
+          </a:p>
+          <a:p>
+            <a:r>
+              <a:rPr lang="en-GB" sz="2400" dirty="0"/>
+              <a:t>Persuasive text may increase usage time, which may not be good for the user’s well-being.</a:t>
+            </a:r>
+          </a:p>
+          <a:p>
+            <a:r>
+              <a:rPr lang="en-GB" sz="2400" dirty="0"/>
+              <a:t>Ensure models are used responsibly, that their alignment target is revisited as deployment contexts change</a:t>
+            </a:r>
+          </a:p>
+          <a:p>
+            <a:r>
+              <a:rPr lang="en-GB" sz="2400" dirty="0"/>
+              <a:t>Data filtering, monitoring, refusing harmful instructions are also necessary.</a:t>
+            </a:r>
+            <a:endParaRPr lang="pt-PT" sz="2400" dirty="0"/>
+          </a:p>
+          <a:p>
+            <a:endParaRPr lang="pt-PT" dirty="0"/>
+          </a:p>
+        </p:txBody>
+      </p:sp>
+    </p:spTree>
+    <p:extLst>
+      <p:ext uri="{BB962C8B-B14F-4D97-AF65-F5344CB8AC3E}">
+        <p14:creationId xmlns:p14="http://schemas.microsoft.com/office/powerpoint/2010/main" val="1059793759"/>
       </p:ext>
     </p:extLst>
   </p:cSld>

</xml_diff>